<commit_message>
updating report and presentation
</commit_message>
<xml_diff>
--- a/project/presentation/Databases project.pptx
+++ b/project/presentation/Databases project.pptx
@@ -11,27 +11,28 @@
     <p:sldId id="260" r:id="rId5"/>
     <p:sldId id="258" r:id="rId6"/>
     <p:sldId id="261" r:id="rId7"/>
-    <p:sldId id="262" r:id="rId8"/>
-    <p:sldId id="263" r:id="rId9"/>
-    <p:sldId id="264" r:id="rId10"/>
-    <p:sldId id="282" r:id="rId11"/>
-    <p:sldId id="283" r:id="rId12"/>
-    <p:sldId id="278" r:id="rId13"/>
-    <p:sldId id="279" r:id="rId14"/>
-    <p:sldId id="265" r:id="rId15"/>
-    <p:sldId id="266" r:id="rId16"/>
-    <p:sldId id="280" r:id="rId17"/>
-    <p:sldId id="281" r:id="rId18"/>
-    <p:sldId id="267" r:id="rId19"/>
-    <p:sldId id="268" r:id="rId20"/>
-    <p:sldId id="269" r:id="rId21"/>
-    <p:sldId id="270" r:id="rId22"/>
-    <p:sldId id="271" r:id="rId23"/>
-    <p:sldId id="272" r:id="rId24"/>
-    <p:sldId id="273" r:id="rId25"/>
-    <p:sldId id="274" r:id="rId26"/>
-    <p:sldId id="275" r:id="rId27"/>
-    <p:sldId id="276" r:id="rId28"/>
+    <p:sldId id="284" r:id="rId8"/>
+    <p:sldId id="262" r:id="rId9"/>
+    <p:sldId id="263" r:id="rId10"/>
+    <p:sldId id="264" r:id="rId11"/>
+    <p:sldId id="282" r:id="rId12"/>
+    <p:sldId id="283" r:id="rId13"/>
+    <p:sldId id="278" r:id="rId14"/>
+    <p:sldId id="279" r:id="rId15"/>
+    <p:sldId id="265" r:id="rId16"/>
+    <p:sldId id="266" r:id="rId17"/>
+    <p:sldId id="280" r:id="rId18"/>
+    <p:sldId id="281" r:id="rId19"/>
+    <p:sldId id="267" r:id="rId20"/>
+    <p:sldId id="268" r:id="rId21"/>
+    <p:sldId id="269" r:id="rId22"/>
+    <p:sldId id="270" r:id="rId23"/>
+    <p:sldId id="271" r:id="rId24"/>
+    <p:sldId id="272" r:id="rId25"/>
+    <p:sldId id="273" r:id="rId26"/>
+    <p:sldId id="274" r:id="rId27"/>
+    <p:sldId id="275" r:id="rId28"/>
+    <p:sldId id="276" r:id="rId29"/>
   </p:sldIdLst>
   <p:sldSz cx="12192000" cy="6858000"/>
   <p:notesSz cx="6858000" cy="9144000"/>
@@ -5854,13 +5855,8 @@
             </a:r>
             <a:r>
               <a:rPr lang="en-US" dirty="0"/>
-              <a:t>, Gabriel </a:t>
-            </a:r>
-            <a:r>
-              <a:rPr lang="en-US" dirty="0" err="1"/>
-              <a:t>davis</a:t>
-            </a:r>
-            <a:endParaRPr lang="en-US" dirty="0"/>
+              <a:t>, Gabriel Davis</a:t>
+            </a:r>
           </a:p>
         </p:txBody>
       </p:sp>
@@ -5904,6 +5900,106 @@
             <p:ph type="title"/>
           </p:nvPr>
         </p:nvSpPr>
+        <p:spPr>
+          <a:xfrm>
+            <a:off x="1045564" y="-169889"/>
+            <a:ext cx="10131425" cy="1456267"/>
+          </a:xfrm>
+        </p:spPr>
+        <p:txBody>
+          <a:bodyPr/>
+          <a:lstStyle/>
+          <a:p>
+            <a:r>
+              <a:rPr lang="en-US" dirty="0"/>
+              <a:t>Result</a:t>
+            </a:r>
+          </a:p>
+        </p:txBody>
+      </p:sp>
+      <p:sp>
+        <p:nvSpPr>
+          <p:cNvPr id="5" name="Content Placeholder 4"/>
+          <p:cNvSpPr>
+            <a:spLocks noGrp="1"/>
+          </p:cNvSpPr>
+          <p:nvPr>
+            <p:ph idx="1"/>
+          </p:nvPr>
+        </p:nvSpPr>
+        <p:spPr/>
+        <p:txBody>
+          <a:bodyPr/>
+          <a:lstStyle/>
+          <a:p>
+            <a:endParaRPr lang="en-US"/>
+          </a:p>
+        </p:txBody>
+      </p:sp>
+      <p:pic>
+        <p:nvPicPr>
+          <p:cNvPr id="6" name="Picture 5"/>
+          <p:cNvPicPr>
+            <a:picLocks noChangeAspect="1"/>
+          </p:cNvPicPr>
+          <p:nvPr/>
+        </p:nvPicPr>
+        <p:blipFill>
+          <a:blip r:embed="rId2"/>
+          <a:stretch>
+            <a:fillRect/>
+          </a:stretch>
+        </p:blipFill>
+        <p:spPr>
+          <a:xfrm>
+            <a:off x="0" y="1673"/>
+            <a:ext cx="12192000" cy="6854653"/>
+          </a:xfrm>
+          <a:prstGeom prst="rect">
+            <a:avLst/>
+          </a:prstGeom>
+        </p:spPr>
+      </p:pic>
+    </p:spTree>
+    <p:extLst>
+      <p:ext uri="{BB962C8B-B14F-4D97-AF65-F5344CB8AC3E}">
+        <p14:creationId xmlns:p14="http://schemas.microsoft.com/office/powerpoint/2010/main" val="518289298"/>
+      </p:ext>
+    </p:extLst>
+  </p:cSld>
+  <p:clrMapOvr>
+    <a:masterClrMapping/>
+  </p:clrMapOvr>
+</p:sld>
+</file>
+
+<file path=ppt/slides/slide11.xml><?xml version="1.0" encoding="utf-8"?>
+<p:sld xmlns:a="http://schemas.openxmlformats.org/drawingml/2006/main" xmlns:r="http://schemas.openxmlformats.org/officeDocument/2006/relationships" xmlns:p="http://schemas.openxmlformats.org/presentationml/2006/main">
+  <p:cSld>
+    <p:spTree>
+      <p:nvGrpSpPr>
+        <p:cNvPr id="1" name=""/>
+        <p:cNvGrpSpPr/>
+        <p:nvPr/>
+      </p:nvGrpSpPr>
+      <p:grpSpPr>
+        <a:xfrm>
+          <a:off x="0" y="0"/>
+          <a:ext cx="0" cy="0"/>
+          <a:chOff x="0" y="0"/>
+          <a:chExt cx="0" cy="0"/>
+        </a:xfrm>
+      </p:grpSpPr>
+      <p:sp>
+        <p:nvSpPr>
+          <p:cNvPr id="2" name="Title 1"/>
+          <p:cNvSpPr>
+            <a:spLocks noGrp="1"/>
+          </p:cNvSpPr>
+          <p:nvPr>
+            <p:ph type="title"/>
+          </p:nvPr>
+        </p:nvSpPr>
         <p:spPr/>
         <p:txBody>
           <a:bodyPr/>
@@ -5948,7 +6044,7 @@
 </p:sld>
 </file>
 
-<file path=ppt/slides/slide11.xml><?xml version="1.0" encoding="utf-8"?>
+<file path=ppt/slides/slide12.xml><?xml version="1.0" encoding="utf-8"?>
 <p:sld xmlns:a="http://schemas.openxmlformats.org/drawingml/2006/main" xmlns:r="http://schemas.openxmlformats.org/officeDocument/2006/relationships" xmlns:p="http://schemas.openxmlformats.org/presentationml/2006/main">
   <p:cSld>
     <p:spTree>
@@ -6040,7 +6136,7 @@
 </p:sld>
 </file>
 
-<file path=ppt/slides/slide12.xml><?xml version="1.0" encoding="utf-8"?>
+<file path=ppt/slides/slide13.xml><?xml version="1.0" encoding="utf-8"?>
 <p:sld xmlns:a="http://schemas.openxmlformats.org/drawingml/2006/main" xmlns:r="http://schemas.openxmlformats.org/officeDocument/2006/relationships" xmlns:p="http://schemas.openxmlformats.org/presentationml/2006/main">
   <p:cSld>
     <p:spTree>
@@ -6174,7 +6270,7 @@
 </p:sld>
 </file>
 
-<file path=ppt/slides/slide13.xml><?xml version="1.0" encoding="utf-8"?>
+<file path=ppt/slides/slide14.xml><?xml version="1.0" encoding="utf-8"?>
 <p:sld xmlns:a="http://schemas.openxmlformats.org/drawingml/2006/main" xmlns:r="http://schemas.openxmlformats.org/officeDocument/2006/relationships" xmlns:p="http://schemas.openxmlformats.org/presentationml/2006/main">
   <p:cSld>
     <p:spTree>
@@ -6266,7 +6362,7 @@
 </p:sld>
 </file>
 
-<file path=ppt/slides/slide14.xml><?xml version="1.0" encoding="utf-8"?>
+<file path=ppt/slides/slide15.xml><?xml version="1.0" encoding="utf-8"?>
 <p:sld xmlns:a="http://schemas.openxmlformats.org/drawingml/2006/main" xmlns:r="http://schemas.openxmlformats.org/officeDocument/2006/relationships" xmlns:p="http://schemas.openxmlformats.org/presentationml/2006/main">
   <p:cSld>
     <p:spTree>
@@ -6446,7 +6542,7 @@
 </p:sld>
 </file>
 
-<file path=ppt/slides/slide15.xml><?xml version="1.0" encoding="utf-8"?>
+<file path=ppt/slides/slide16.xml><?xml version="1.0" encoding="utf-8"?>
 <p:sld xmlns:a="http://schemas.openxmlformats.org/drawingml/2006/main" xmlns:r="http://schemas.openxmlformats.org/officeDocument/2006/relationships" xmlns:p="http://schemas.openxmlformats.org/presentationml/2006/main">
   <p:cSld>
     <p:spTree>
@@ -6541,7 +6637,7 @@
 </p:sld>
 </file>
 
-<file path=ppt/slides/slide16.xml><?xml version="1.0" encoding="utf-8"?>
+<file path=ppt/slides/slide17.xml><?xml version="1.0" encoding="utf-8"?>
 <p:sld xmlns:a="http://schemas.openxmlformats.org/drawingml/2006/main" xmlns:r="http://schemas.openxmlformats.org/officeDocument/2006/relationships" xmlns:p="http://schemas.openxmlformats.org/presentationml/2006/main">
   <p:cSld>
     <p:spTree>
@@ -6716,7 +6812,7 @@
 </p:sld>
 </file>
 
-<file path=ppt/slides/slide17.xml><?xml version="1.0" encoding="utf-8"?>
+<file path=ppt/slides/slide18.xml><?xml version="1.0" encoding="utf-8"?>
 <p:sld xmlns:a="http://schemas.openxmlformats.org/drawingml/2006/main" xmlns:r="http://schemas.openxmlformats.org/officeDocument/2006/relationships" xmlns:p="http://schemas.openxmlformats.org/presentationml/2006/main">
   <p:cSld>
     <p:spTree>
@@ -6808,7 +6904,7 @@
 </p:sld>
 </file>
 
-<file path=ppt/slides/slide18.xml><?xml version="1.0" encoding="utf-8"?>
+<file path=ppt/slides/slide19.xml><?xml version="1.0" encoding="utf-8"?>
 <p:sld xmlns:a="http://schemas.openxmlformats.org/drawingml/2006/main" xmlns:r="http://schemas.openxmlformats.org/officeDocument/2006/relationships" xmlns:p="http://schemas.openxmlformats.org/presentationml/2006/main">
   <p:cSld>
     <p:spTree>
@@ -6945,7 +7041,136 @@
 </p:sld>
 </file>
 
-<file path=ppt/slides/slide19.xml><?xml version="1.0" encoding="utf-8"?>
+<file path=ppt/slides/slide2.xml><?xml version="1.0" encoding="utf-8"?>
+<p:sld xmlns:a="http://schemas.openxmlformats.org/drawingml/2006/main" xmlns:r="http://schemas.openxmlformats.org/officeDocument/2006/relationships" xmlns:p="http://schemas.openxmlformats.org/presentationml/2006/main">
+  <p:cSld>
+    <p:spTree>
+      <p:nvGrpSpPr>
+        <p:cNvPr id="1" name=""/>
+        <p:cNvGrpSpPr/>
+        <p:nvPr/>
+      </p:nvGrpSpPr>
+      <p:grpSpPr>
+        <a:xfrm>
+          <a:off x="0" y="0"/>
+          <a:ext cx="0" cy="0"/>
+          <a:chOff x="0" y="0"/>
+          <a:chExt cx="0" cy="0"/>
+        </a:xfrm>
+      </p:grpSpPr>
+      <p:sp>
+        <p:nvSpPr>
+          <p:cNvPr id="2" name="Title 1"/>
+          <p:cNvSpPr>
+            <a:spLocks noGrp="1"/>
+          </p:cNvSpPr>
+          <p:nvPr>
+            <p:ph type="title"/>
+          </p:nvPr>
+        </p:nvSpPr>
+        <p:spPr/>
+        <p:txBody>
+          <a:bodyPr/>
+          <a:lstStyle/>
+          <a:p>
+            <a:pPr algn="ctr"/>
+            <a:r>
+              <a:rPr lang="en-US" b="1" dirty="0" err="1"/>
+              <a:t>MOtivations</a:t>
+            </a:r>
+            <a:endParaRPr lang="en-US" b="1" dirty="0"/>
+          </a:p>
+        </p:txBody>
+      </p:sp>
+      <p:sp>
+        <p:nvSpPr>
+          <p:cNvPr id="3" name="Content Placeholder 2"/>
+          <p:cNvSpPr>
+            <a:spLocks noGrp="1"/>
+          </p:cNvSpPr>
+          <p:nvPr>
+            <p:ph idx="1"/>
+          </p:nvPr>
+        </p:nvSpPr>
+        <p:spPr/>
+        <p:txBody>
+          <a:bodyPr/>
+          <a:lstStyle/>
+          <a:p>
+            <a:r>
+              <a:rPr lang="en-US" dirty="0"/>
+              <a:t>Magic the gathering, or </a:t>
+            </a:r>
+            <a:r>
+              <a:rPr lang="en-US" dirty="0" err="1"/>
+              <a:t>MtG</a:t>
+            </a:r>
+            <a:r>
+              <a:rPr lang="en-US" dirty="0"/>
+              <a:t>, is a popular trading card game owned by Wizards of the Coast, LLC. An estimated 20 million players play </a:t>
+            </a:r>
+            <a:r>
+              <a:rPr lang="en-US" dirty="0" err="1"/>
+              <a:t>MtG</a:t>
+            </a:r>
+            <a:r>
+              <a:rPr lang="en-US" dirty="0"/>
+              <a:t> around the world. </a:t>
+            </a:r>
+            <a:r>
+              <a:rPr lang="en-US" dirty="0" err="1"/>
+              <a:t>MtG</a:t>
+            </a:r>
+            <a:r>
+              <a:rPr lang="en-US" dirty="0"/>
+              <a:t> has been printed in 11 different languages and is played competitively, with prize pools reaching around $250,000. Wizards of the Coast sponsors a considerable number of these tournaments.</a:t>
+            </a:r>
+          </a:p>
+          <a:p>
+            <a:endParaRPr lang="en-US" dirty="0"/>
+          </a:p>
+          <a:p>
+            <a:r>
+              <a:rPr lang="en-US" dirty="0" err="1"/>
+              <a:t>MtG</a:t>
+            </a:r>
+            <a:r>
+              <a:rPr lang="en-US" dirty="0"/>
+              <a:t> by design has incredible diversity in the types of decks that may be constructed. Our group wants to analyze decks used in the competitive scene of </a:t>
+            </a:r>
+            <a:r>
+              <a:rPr lang="en-US" dirty="0" err="1"/>
+              <a:t>MtG</a:t>
+            </a:r>
+            <a:r>
+              <a:rPr lang="en-US" dirty="0"/>
+              <a:t> to identify the popularity of select decks and cards by using a relational database. We believe that this information could be useful to </a:t>
+            </a:r>
+            <a:r>
+              <a:rPr lang="en-US" dirty="0" err="1"/>
+              <a:t>MtG</a:t>
+            </a:r>
+            <a:r>
+              <a:rPr lang="en-US" dirty="0"/>
+              <a:t> players for constructing new and exciting decks.</a:t>
+            </a:r>
+          </a:p>
+        </p:txBody>
+      </p:sp>
+    </p:spTree>
+    <p:extLst>
+      <p:ext uri="{BB962C8B-B14F-4D97-AF65-F5344CB8AC3E}">
+        <p14:creationId xmlns:p14="http://schemas.microsoft.com/office/powerpoint/2010/main" val="825969262"/>
+      </p:ext>
+    </p:extLst>
+  </p:cSld>
+  <p:clrMapOvr>
+    <a:masterClrMapping/>
+  </p:clrMapOvr>
+</p:sld>
+</file>
+
+<file path=ppt/slides/slide20.xml><?xml version="1.0" encoding="utf-8"?>
 <p:sld xmlns:a="http://schemas.openxmlformats.org/drawingml/2006/main" xmlns:r="http://schemas.openxmlformats.org/officeDocument/2006/relationships" xmlns:p="http://schemas.openxmlformats.org/presentationml/2006/main">
   <p:cSld>
     <p:spTree>
@@ -7040,289 +7265,6 @@
 </p:sld>
 </file>
 
-<file path=ppt/slides/slide2.xml><?xml version="1.0" encoding="utf-8"?>
-<p:sld xmlns:a="http://schemas.openxmlformats.org/drawingml/2006/main" xmlns:r="http://schemas.openxmlformats.org/officeDocument/2006/relationships" xmlns:p="http://schemas.openxmlformats.org/presentationml/2006/main">
-  <p:cSld>
-    <p:spTree>
-      <p:nvGrpSpPr>
-        <p:cNvPr id="1" name=""/>
-        <p:cNvGrpSpPr/>
-        <p:nvPr/>
-      </p:nvGrpSpPr>
-      <p:grpSpPr>
-        <a:xfrm>
-          <a:off x="0" y="0"/>
-          <a:ext cx="0" cy="0"/>
-          <a:chOff x="0" y="0"/>
-          <a:chExt cx="0" cy="0"/>
-        </a:xfrm>
-      </p:grpSpPr>
-      <p:sp>
-        <p:nvSpPr>
-          <p:cNvPr id="2" name="Title 1"/>
-          <p:cNvSpPr>
-            <a:spLocks noGrp="1"/>
-          </p:cNvSpPr>
-          <p:nvPr>
-            <p:ph type="title"/>
-          </p:nvPr>
-        </p:nvSpPr>
-        <p:spPr/>
-        <p:txBody>
-          <a:bodyPr/>
-          <a:lstStyle/>
-          <a:p>
-            <a:pPr algn="ctr"/>
-            <a:r>
-              <a:rPr lang="en-US" b="1" dirty="0" err="1"/>
-              <a:t>MOtivations</a:t>
-            </a:r>
-            <a:endParaRPr lang="en-US" b="1" dirty="0"/>
-          </a:p>
-        </p:txBody>
-      </p:sp>
-      <p:sp>
-        <p:nvSpPr>
-          <p:cNvPr id="3" name="Content Placeholder 2"/>
-          <p:cNvSpPr>
-            <a:spLocks noGrp="1"/>
-          </p:cNvSpPr>
-          <p:nvPr>
-            <p:ph idx="1"/>
-          </p:nvPr>
-        </p:nvSpPr>
-        <p:spPr/>
-        <p:txBody>
-          <a:bodyPr/>
-          <a:lstStyle/>
-          <a:p>
-            <a:r>
-              <a:rPr lang="en-US" dirty="0"/>
-              <a:t>Magic the gathering, or </a:t>
-            </a:r>
-            <a:r>
-              <a:rPr lang="en-US" dirty="0" err="1"/>
-              <a:t>MtG</a:t>
-            </a:r>
-            <a:r>
-              <a:rPr lang="en-US" dirty="0"/>
-              <a:t>, is a popular trading card game owned by Wizards of the Coast LLC. An estimated 20 million players play </a:t>
-            </a:r>
-            <a:r>
-              <a:rPr lang="en-US" dirty="0" err="1"/>
-              <a:t>MtG</a:t>
-            </a:r>
-            <a:r>
-              <a:rPr lang="en-US" dirty="0"/>
-              <a:t> around the world. </a:t>
-            </a:r>
-            <a:r>
-              <a:rPr lang="en-US" dirty="0" err="1"/>
-              <a:t>MtG</a:t>
-            </a:r>
-            <a:r>
-              <a:rPr lang="en-US" dirty="0"/>
-              <a:t> has been printed in 11 different languages and is played competitively, with prize pools reaching around $250,000. Wizards of the Coast sponsors a considerable number of these tournaments.</a:t>
-            </a:r>
-          </a:p>
-          <a:p>
-            <a:endParaRPr lang="en-US" dirty="0"/>
-          </a:p>
-          <a:p>
-            <a:r>
-              <a:rPr lang="en-US" dirty="0" err="1"/>
-              <a:t>MtG</a:t>
-            </a:r>
-            <a:r>
-              <a:rPr lang="en-US" dirty="0"/>
-              <a:t> by design has incredible diversity in the types of decks that may be constructed. Our group wants to analyze decks used in the competitive scene of </a:t>
-            </a:r>
-            <a:r>
-              <a:rPr lang="en-US" dirty="0" err="1"/>
-              <a:t>MtG</a:t>
-            </a:r>
-            <a:r>
-              <a:rPr lang="en-US" dirty="0"/>
-              <a:t> to identify the popularity of select decks and cards by using a relational database. We believe that this information could be useful to </a:t>
-            </a:r>
-            <a:r>
-              <a:rPr lang="en-US" dirty="0" err="1"/>
-              <a:t>MtG</a:t>
-            </a:r>
-            <a:r>
-              <a:rPr lang="en-US" dirty="0"/>
-              <a:t> players for constructing new and exciting decks.</a:t>
-            </a:r>
-          </a:p>
-        </p:txBody>
-      </p:sp>
-    </p:spTree>
-    <p:extLst>
-      <p:ext uri="{BB962C8B-B14F-4D97-AF65-F5344CB8AC3E}">
-        <p14:creationId xmlns:p14="http://schemas.microsoft.com/office/powerpoint/2010/main" val="825969262"/>
-      </p:ext>
-    </p:extLst>
-  </p:cSld>
-  <p:clrMapOvr>
-    <a:masterClrMapping/>
-  </p:clrMapOvr>
-</p:sld>
-</file>
-
-<file path=ppt/slides/slide20.xml><?xml version="1.0" encoding="utf-8"?>
-<p:sld xmlns:a="http://schemas.openxmlformats.org/drawingml/2006/main" xmlns:r="http://schemas.openxmlformats.org/officeDocument/2006/relationships" xmlns:p="http://schemas.openxmlformats.org/presentationml/2006/main">
-  <p:cSld>
-    <p:spTree>
-      <p:nvGrpSpPr>
-        <p:cNvPr id="1" name=""/>
-        <p:cNvGrpSpPr/>
-        <p:nvPr/>
-      </p:nvGrpSpPr>
-      <p:grpSpPr>
-        <a:xfrm>
-          <a:off x="0" y="0"/>
-          <a:ext cx="0" cy="0"/>
-          <a:chOff x="0" y="0"/>
-          <a:chExt cx="0" cy="0"/>
-        </a:xfrm>
-      </p:grpSpPr>
-      <p:sp>
-        <p:nvSpPr>
-          <p:cNvPr id="2" name="Title 1"/>
-          <p:cNvSpPr>
-            <a:spLocks noGrp="1"/>
-          </p:cNvSpPr>
-          <p:nvPr>
-            <p:ph type="title"/>
-          </p:nvPr>
-        </p:nvSpPr>
-        <p:spPr/>
-        <p:txBody>
-          <a:bodyPr/>
-          <a:lstStyle/>
-          <a:p>
-            <a:r>
-              <a:rPr lang="en-US" dirty="0"/>
-              <a:t>The most aggressive decks</a:t>
-            </a:r>
-          </a:p>
-        </p:txBody>
-      </p:sp>
-      <p:sp>
-        <p:nvSpPr>
-          <p:cNvPr id="3" name="Content Placeholder 2"/>
-          <p:cNvSpPr>
-            <a:spLocks noGrp="1"/>
-          </p:cNvSpPr>
-          <p:nvPr>
-            <p:ph idx="1"/>
-          </p:nvPr>
-        </p:nvSpPr>
-        <p:spPr/>
-        <p:txBody>
-          <a:bodyPr/>
-          <a:lstStyle/>
-          <a:p>
-            <a:r>
-              <a:rPr lang="en-US" dirty="0"/>
-              <a:t>SELECT AVG(</a:t>
-            </a:r>
-            <a:r>
-              <a:rPr lang="en-US" dirty="0" err="1"/>
-              <a:t>card_name.c</a:t>
-            </a:r>
-            <a:r>
-              <a:rPr lang="en-US" dirty="0"/>
-              <a:t>) as %_of_cards_below_2_mana</a:t>
-            </a:r>
-          </a:p>
-          <a:p>
-            <a:r>
-              <a:rPr lang="en-US" dirty="0"/>
-              <a:t>FROM cards as c, </a:t>
-            </a:r>
-            <a:r>
-              <a:rPr lang="en-US" dirty="0" err="1"/>
-              <a:t>deck_representation</a:t>
-            </a:r>
-            <a:r>
-              <a:rPr lang="en-US" dirty="0"/>
-              <a:t> as r</a:t>
-            </a:r>
-          </a:p>
-          <a:p>
-            <a:r>
-              <a:rPr lang="en-US" dirty="0"/>
-              <a:t>WHERE </a:t>
-            </a:r>
-            <a:r>
-              <a:rPr lang="en-US" dirty="0" err="1"/>
-              <a:t>mana_cost.c</a:t>
-            </a:r>
-            <a:r>
-              <a:rPr lang="en-US" dirty="0"/>
-              <a:t> IS NOT NULL AND </a:t>
-            </a:r>
-            <a:r>
-              <a:rPr lang="en-US" dirty="0" err="1"/>
-              <a:t>mana_cost.c</a:t>
-            </a:r>
-            <a:r>
-              <a:rPr lang="en-US" dirty="0"/>
-              <a:t> &lt;= 2 AND </a:t>
-            </a:r>
-            <a:r>
-              <a:rPr lang="en-US" dirty="0" err="1"/>
-              <a:t>r.card_name</a:t>
-            </a:r>
-            <a:r>
-              <a:rPr lang="en-US" dirty="0"/>
-              <a:t> = </a:t>
-            </a:r>
-            <a:r>
-              <a:rPr lang="en-US" dirty="0" err="1"/>
-              <a:t>c.card_name</a:t>
-            </a:r>
-            <a:endParaRPr lang="en-US" dirty="0"/>
-          </a:p>
-          <a:p>
-            <a:r>
-              <a:rPr lang="en-US" dirty="0"/>
-              <a:t>GROUP BY </a:t>
-            </a:r>
-            <a:r>
-              <a:rPr lang="en-US" dirty="0" err="1"/>
-              <a:t>deck_name.r</a:t>
-            </a:r>
-            <a:endParaRPr lang="en-US" dirty="0"/>
-          </a:p>
-          <a:p>
-            <a:r>
-              <a:rPr lang="en-US" dirty="0"/>
-              <a:t>HAVING %_of_cards_below_2_mana &gt;= .6</a:t>
-            </a:r>
-          </a:p>
-          <a:p>
-            <a:r>
-              <a:rPr lang="en-US" dirty="0"/>
-              <a:t>ORDER BY %_of_cards_below_2_mana ASC</a:t>
-            </a:r>
-          </a:p>
-        </p:txBody>
-      </p:sp>
-    </p:spTree>
-    <p:extLst>
-      <p:ext uri="{BB962C8B-B14F-4D97-AF65-F5344CB8AC3E}">
-        <p14:creationId xmlns:p14="http://schemas.microsoft.com/office/powerpoint/2010/main" val="406966270"/>
-      </p:ext>
-    </p:extLst>
-  </p:cSld>
-  <p:clrMapOvr>
-    <a:masterClrMapping/>
-  </p:clrMapOvr>
-</p:sld>
-</file>
-
 <file path=ppt/slides/slide21.xml><?xml version="1.0" encoding="utf-8"?>
 <p:sld xmlns:a="http://schemas.openxmlformats.org/drawingml/2006/main" xmlns:r="http://schemas.openxmlformats.org/officeDocument/2006/relationships" xmlns:p="http://schemas.openxmlformats.org/presentationml/2006/main">
   <p:cSld>
@@ -7357,7 +7299,7 @@
           <a:p>
             <a:r>
               <a:rPr lang="en-US" dirty="0"/>
-              <a:t>result</a:t>
+              <a:t>The most aggressive decks</a:t>
             </a:r>
           </a:p>
         </p:txBody>
@@ -7377,14 +7319,97 @@
           <a:bodyPr/>
           <a:lstStyle/>
           <a:p>
-            <a:endParaRPr lang="en-US"/>
+            <a:r>
+              <a:rPr lang="en-US" dirty="0"/>
+              <a:t>SELECT AVG(</a:t>
+            </a:r>
+            <a:r>
+              <a:rPr lang="en-US" dirty="0" err="1"/>
+              <a:t>card_name.c</a:t>
+            </a:r>
+            <a:r>
+              <a:rPr lang="en-US" dirty="0"/>
+              <a:t>) as %_of_cards_below_2_mana</a:t>
+            </a:r>
+          </a:p>
+          <a:p>
+            <a:r>
+              <a:rPr lang="en-US" dirty="0"/>
+              <a:t>FROM cards as c, </a:t>
+            </a:r>
+            <a:r>
+              <a:rPr lang="en-US" dirty="0" err="1"/>
+              <a:t>deck_representation</a:t>
+            </a:r>
+            <a:r>
+              <a:rPr lang="en-US" dirty="0"/>
+              <a:t> as r</a:t>
+            </a:r>
+          </a:p>
+          <a:p>
+            <a:r>
+              <a:rPr lang="en-US" dirty="0"/>
+              <a:t>WHERE </a:t>
+            </a:r>
+            <a:r>
+              <a:rPr lang="en-US" dirty="0" err="1"/>
+              <a:t>mana_cost.c</a:t>
+            </a:r>
+            <a:r>
+              <a:rPr lang="en-US" dirty="0"/>
+              <a:t> IS NOT NULL AND </a:t>
+            </a:r>
+            <a:r>
+              <a:rPr lang="en-US" dirty="0" err="1"/>
+              <a:t>mana_cost.c</a:t>
+            </a:r>
+            <a:r>
+              <a:rPr lang="en-US" dirty="0"/>
+              <a:t> &lt;= 2 AND </a:t>
+            </a:r>
+            <a:r>
+              <a:rPr lang="en-US" dirty="0" err="1"/>
+              <a:t>r.card_name</a:t>
+            </a:r>
+            <a:r>
+              <a:rPr lang="en-US" dirty="0"/>
+              <a:t> = </a:t>
+            </a:r>
+            <a:r>
+              <a:rPr lang="en-US" dirty="0" err="1"/>
+              <a:t>c.card_name</a:t>
+            </a:r>
+            <a:endParaRPr lang="en-US" dirty="0"/>
+          </a:p>
+          <a:p>
+            <a:r>
+              <a:rPr lang="en-US" dirty="0"/>
+              <a:t>GROUP BY </a:t>
+            </a:r>
+            <a:r>
+              <a:rPr lang="en-US" dirty="0" err="1"/>
+              <a:t>deck_name.r</a:t>
+            </a:r>
+            <a:endParaRPr lang="en-US" dirty="0"/>
+          </a:p>
+          <a:p>
+            <a:r>
+              <a:rPr lang="en-US" dirty="0"/>
+              <a:t>HAVING %_of_cards_below_2_mana &gt;= .6</a:t>
+            </a:r>
+          </a:p>
+          <a:p>
+            <a:r>
+              <a:rPr lang="en-US" dirty="0"/>
+              <a:t>ORDER BY %_of_cards_below_2_mana ASC</a:t>
+            </a:r>
           </a:p>
         </p:txBody>
       </p:sp>
     </p:spTree>
     <p:extLst>
       <p:ext uri="{BB962C8B-B14F-4D97-AF65-F5344CB8AC3E}">
-        <p14:creationId xmlns:p14="http://schemas.microsoft.com/office/powerpoint/2010/main" val="2242299049"/>
+        <p14:creationId xmlns:p14="http://schemas.microsoft.com/office/powerpoint/2010/main" val="406966270"/>
       </p:ext>
     </p:extLst>
   </p:cSld>
@@ -7428,6 +7453,77 @@
           <a:p>
             <a:r>
               <a:rPr lang="en-US" dirty="0"/>
+              <a:t>result</a:t>
+            </a:r>
+          </a:p>
+        </p:txBody>
+      </p:sp>
+      <p:sp>
+        <p:nvSpPr>
+          <p:cNvPr id="3" name="Content Placeholder 2"/>
+          <p:cNvSpPr>
+            <a:spLocks noGrp="1"/>
+          </p:cNvSpPr>
+          <p:nvPr>
+            <p:ph idx="1"/>
+          </p:nvPr>
+        </p:nvSpPr>
+        <p:spPr/>
+        <p:txBody>
+          <a:bodyPr/>
+          <a:lstStyle/>
+          <a:p>
+            <a:endParaRPr lang="en-US"/>
+          </a:p>
+        </p:txBody>
+      </p:sp>
+    </p:spTree>
+    <p:extLst>
+      <p:ext uri="{BB962C8B-B14F-4D97-AF65-F5344CB8AC3E}">
+        <p14:creationId xmlns:p14="http://schemas.microsoft.com/office/powerpoint/2010/main" val="2242299049"/>
+      </p:ext>
+    </p:extLst>
+  </p:cSld>
+  <p:clrMapOvr>
+    <a:masterClrMapping/>
+  </p:clrMapOvr>
+</p:sld>
+</file>
+
+<file path=ppt/slides/slide23.xml><?xml version="1.0" encoding="utf-8"?>
+<p:sld xmlns:a="http://schemas.openxmlformats.org/drawingml/2006/main" xmlns:r="http://schemas.openxmlformats.org/officeDocument/2006/relationships" xmlns:p="http://schemas.openxmlformats.org/presentationml/2006/main">
+  <p:cSld>
+    <p:spTree>
+      <p:nvGrpSpPr>
+        <p:cNvPr id="1" name=""/>
+        <p:cNvGrpSpPr/>
+        <p:nvPr/>
+      </p:nvGrpSpPr>
+      <p:grpSpPr>
+        <a:xfrm>
+          <a:off x="0" y="0"/>
+          <a:ext cx="0" cy="0"/>
+          <a:chOff x="0" y="0"/>
+          <a:chExt cx="0" cy="0"/>
+        </a:xfrm>
+      </p:grpSpPr>
+      <p:sp>
+        <p:nvSpPr>
+          <p:cNvPr id="2" name="Title 1"/>
+          <p:cNvSpPr>
+            <a:spLocks noGrp="1"/>
+          </p:cNvSpPr>
+          <p:nvPr>
+            <p:ph type="title"/>
+          </p:nvPr>
+        </p:nvSpPr>
+        <p:spPr/>
+        <p:txBody>
+          <a:bodyPr/>
+          <a:lstStyle/>
+          <a:p>
+            <a:r>
+              <a:rPr lang="en-US" dirty="0"/>
               <a:t>Tournaments with the highest variance in cards used</a:t>
             </a:r>
           </a:p>
@@ -7583,7 +7679,7 @@
 </p:sld>
 </file>
 
-<file path=ppt/slides/slide23.xml><?xml version="1.0" encoding="utf-8"?>
+<file path=ppt/slides/slide24.xml><?xml version="1.0" encoding="utf-8"?>
 <p:sld xmlns:a="http://schemas.openxmlformats.org/drawingml/2006/main" xmlns:r="http://schemas.openxmlformats.org/officeDocument/2006/relationships" xmlns:p="http://schemas.openxmlformats.org/presentationml/2006/main">
   <p:cSld>
     <p:spTree>
@@ -7678,7 +7774,7 @@
 </p:sld>
 </file>
 
-<file path=ppt/slides/slide24.xml><?xml version="1.0" encoding="utf-8"?>
+<file path=ppt/slides/slide25.xml><?xml version="1.0" encoding="utf-8"?>
 <p:sld xmlns:a="http://schemas.openxmlformats.org/drawingml/2006/main" xmlns:r="http://schemas.openxmlformats.org/officeDocument/2006/relationships" xmlns:p="http://schemas.openxmlformats.org/presentationml/2006/main">
   <p:cSld>
     <p:spTree>
@@ -7712,7 +7808,7 @@
           <a:p>
             <a:r>
               <a:rPr lang="en-US" dirty="0"/>
-              <a:t>My time to shine</a:t>
+              <a:t>My time to shine (Cards unique to their tournament)</a:t>
             </a:r>
           </a:p>
         </p:txBody>
@@ -7867,7 +7963,7 @@
 </p:sld>
 </file>
 
-<file path=ppt/slides/slide25.xml><?xml version="1.0" encoding="utf-8"?>
+<file path=ppt/slides/slide26.xml><?xml version="1.0" encoding="utf-8"?>
 <p:sld xmlns:a="http://schemas.openxmlformats.org/drawingml/2006/main" xmlns:r="http://schemas.openxmlformats.org/officeDocument/2006/relationships" xmlns:p="http://schemas.openxmlformats.org/presentationml/2006/main">
   <p:cSld>
     <p:spTree>
@@ -7962,7 +8058,7 @@
 </p:sld>
 </file>
 
-<file path=ppt/slides/slide26.xml><?xml version="1.0" encoding="utf-8"?>
+<file path=ppt/slides/slide27.xml><?xml version="1.0" encoding="utf-8"?>
 <p:sld xmlns:a="http://schemas.openxmlformats.org/drawingml/2006/main" xmlns:r="http://schemas.openxmlformats.org/officeDocument/2006/relationships" xmlns:p="http://schemas.openxmlformats.org/presentationml/2006/main">
   <p:cSld>
     <p:spTree>
@@ -8178,7 +8274,7 @@
 </p:sld>
 </file>
 
-<file path=ppt/slides/slide27.xml><?xml version="1.0" encoding="utf-8"?>
+<file path=ppt/slides/slide28.xml><?xml version="1.0" encoding="utf-8"?>
 <p:sld xmlns:a="http://schemas.openxmlformats.org/drawingml/2006/main" xmlns:r="http://schemas.openxmlformats.org/officeDocument/2006/relationships" xmlns:p="http://schemas.openxmlformats.org/presentationml/2006/main">
   <p:cSld>
     <p:spTree>
@@ -8578,7 +8674,7 @@
         <p:spPr>
           <a:xfrm>
             <a:off x="508959" y="2475781"/>
-            <a:ext cx="8381580" cy="3970318"/>
+            <a:ext cx="8381580" cy="3693319"/>
           </a:xfrm>
           <a:prstGeom prst="rect">
             <a:avLst/>
@@ -8599,19 +8695,13 @@
           <a:p>
             <a:r>
               <a:rPr lang="en-US" dirty="0"/>
-              <a:t>•	Cards may have multiple types and have a subtype </a:t>
+              <a:t>•	Cards may have multiple types and multiple subtypes </a:t>
             </a:r>
           </a:p>
           <a:p>
             <a:r>
               <a:rPr lang="en-US" dirty="0"/>
               <a:t>o	example: | Steel Overseer (card name) | Artifact creature (multiple type) – construct (subtype) |</a:t>
-            </a:r>
-          </a:p>
-          <a:p>
-            <a:r>
-              <a:rPr lang="en-US" dirty="0"/>
-              <a:t>•	For competitions, location may be unspecified</a:t>
             </a:r>
           </a:p>
           <a:p>
@@ -9772,7 +9862,7 @@
             <a:spLocks noGrp="1"/>
           </p:cNvSpPr>
           <p:nvPr>
-            <p:ph type="ctrTitle"/>
+            <p:ph type="title"/>
           </p:nvPr>
         </p:nvSpPr>
         <p:spPr/>
@@ -9782,19 +9872,19 @@
           <a:p>
             <a:r>
               <a:rPr lang="en-US" dirty="0"/>
-              <a:t>Our database queries</a:t>
-            </a:r>
-          </a:p>
-        </p:txBody>
-      </p:sp>
-      <p:sp>
-        <p:nvSpPr>
-          <p:cNvPr id="3" name="Subtitle 2"/>
-          <p:cNvSpPr>
-            <a:spLocks noGrp="1"/>
-          </p:cNvSpPr>
-          <p:nvPr>
-            <p:ph type="subTitle" idx="1"/>
+              <a:t>Data Collection</a:t>
+            </a:r>
+          </a:p>
+        </p:txBody>
+      </p:sp>
+      <p:sp>
+        <p:nvSpPr>
+          <p:cNvPr id="3" name="Content Placeholder 2"/>
+          <p:cNvSpPr>
+            <a:spLocks noGrp="1"/>
+          </p:cNvSpPr>
+          <p:nvPr>
+            <p:ph idx="1"/>
           </p:nvPr>
         </p:nvSpPr>
         <p:spPr/>
@@ -9802,14 +9892,64 @@
           <a:bodyPr/>
           <a:lstStyle/>
           <a:p>
-            <a:endParaRPr lang="en-US"/>
+            <a:r>
+              <a:rPr lang="en-US" dirty="0"/>
+              <a:t>Data was collected from the official website of Wizards of the Coast, on a page containing the </a:t>
+            </a:r>
+            <a:r>
+              <a:rPr lang="en-US" dirty="0" err="1"/>
+              <a:t>decklists</a:t>
+            </a:r>
+            <a:r>
+              <a:rPr lang="en-US" dirty="0"/>
+              <a:t> of the top 8 decks of the 2017 Grand Prix tournament series (top 12 decks of the Team Grand Prix in San Antonio)</a:t>
+            </a:r>
+          </a:p>
+          <a:p>
+            <a:pPr lvl="1"/>
+            <a:r>
+              <a:rPr lang="en-US" dirty="0"/>
+              <a:t>http://magic.wizards.com/en/articles/winning-decks</a:t>
+            </a:r>
+            <a:endParaRPr lang="en-US" dirty="0"/>
+          </a:p>
+          <a:p>
+            <a:r>
+              <a:rPr lang="en-US" dirty="0"/>
+              <a:t>Data was parsed into MySQL-readable form by a custom Java program, and loaded into the database via a shell script.</a:t>
+            </a:r>
+          </a:p>
+          <a:p>
+            <a:pPr lvl="1"/>
+            <a:r>
+              <a:rPr lang="en-US" dirty="0"/>
+              <a:t>The Java program utilized an open-source API to retrieve information </a:t>
+            </a:r>
+            <a:r>
+              <a:rPr lang="en-US"/>
+              <a:t>about each card, </a:t>
+            </a:r>
+            <a:r>
+              <a:rPr lang="en-US" dirty="0"/>
+              <a:t>found at </a:t>
+            </a:r>
+            <a:r>
+              <a:rPr lang="en-US" dirty="0">
+                <a:hlinkClick r:id="rId2"/>
+              </a:rPr>
+              <a:t>http://magicthegathering.io</a:t>
+            </a:r>
+            <a:r>
+              <a:rPr lang="en-US" dirty="0"/>
+              <a:t>.</a:t>
+            </a:r>
           </a:p>
         </p:txBody>
       </p:sp>
     </p:spTree>
     <p:extLst>
       <p:ext uri="{BB962C8B-B14F-4D97-AF65-F5344CB8AC3E}">
-        <p14:creationId xmlns:p14="http://schemas.microsoft.com/office/powerpoint/2010/main" val="847096583"/>
+        <p14:creationId xmlns:p14="http://schemas.microsoft.com/office/powerpoint/2010/main" val="1817441528"/>
       </p:ext>
     </p:extLst>
   </p:cSld>
@@ -9843,7 +9983,7 @@
             <a:spLocks noGrp="1"/>
           </p:cNvSpPr>
           <p:nvPr>
-            <p:ph type="title"/>
+            <p:ph type="ctrTitle"/>
           </p:nvPr>
         </p:nvSpPr>
         <p:spPr/>
@@ -9853,19 +9993,19 @@
           <a:p>
             <a:r>
               <a:rPr lang="en-US" dirty="0"/>
-              <a:t>All exclusively black and green cards</a:t>
-            </a:r>
-          </a:p>
-        </p:txBody>
-      </p:sp>
-      <p:sp>
-        <p:nvSpPr>
-          <p:cNvPr id="3" name="Content Placeholder 2"/>
-          <p:cNvSpPr>
-            <a:spLocks noGrp="1"/>
-          </p:cNvSpPr>
-          <p:nvPr>
-            <p:ph idx="1"/>
+              <a:t>Our database queries</a:t>
+            </a:r>
+          </a:p>
+        </p:txBody>
+      </p:sp>
+      <p:sp>
+        <p:nvSpPr>
+          <p:cNvPr id="3" name="Subtitle 2"/>
+          <p:cNvSpPr>
+            <a:spLocks noGrp="1"/>
+          </p:cNvSpPr>
+          <p:nvPr>
+            <p:ph type="subTitle" idx="1"/>
           </p:nvPr>
         </p:nvSpPr>
         <p:spPr/>
@@ -9873,107 +10013,14 @@
           <a:bodyPr/>
           <a:lstStyle/>
           <a:p>
-            <a:r>
-              <a:rPr lang="en-US" dirty="0"/>
-              <a:t>SELECT *</a:t>
-            </a:r>
-          </a:p>
-          <a:p>
-            <a:r>
-              <a:rPr lang="en-US" dirty="0"/>
-              <a:t>FROM cards</a:t>
-            </a:r>
-          </a:p>
-          <a:p>
-            <a:r>
-              <a:rPr lang="en-US" dirty="0"/>
-              <a:t>WHERE </a:t>
-            </a:r>
-            <a:r>
-              <a:rPr lang="en-US" dirty="0" err="1"/>
-              <a:t>card.black</a:t>
-            </a:r>
-            <a:r>
-              <a:rPr lang="en-US" dirty="0"/>
-              <a:t> = 1 and</a:t>
-            </a:r>
-          </a:p>
-          <a:p>
-            <a:r>
-              <a:rPr lang="en-US" dirty="0"/>
-              <a:t>      </a:t>
-            </a:r>
-            <a:r>
-              <a:rPr lang="en-US" dirty="0" err="1"/>
-              <a:t>card.green</a:t>
-            </a:r>
-            <a:r>
-              <a:rPr lang="en-US" dirty="0"/>
-              <a:t> = 1 and</a:t>
-            </a:r>
-          </a:p>
-          <a:p>
-            <a:r>
-              <a:rPr lang="en-US" dirty="0"/>
-              <a:t>      </a:t>
-            </a:r>
-            <a:r>
-              <a:rPr lang="en-US" dirty="0" err="1"/>
-              <a:t>card.white</a:t>
-            </a:r>
-            <a:r>
-              <a:rPr lang="en-US" dirty="0"/>
-              <a:t> = 0 and</a:t>
-            </a:r>
-          </a:p>
-          <a:p>
-            <a:r>
-              <a:rPr lang="en-US" dirty="0"/>
-              <a:t>      </a:t>
-            </a:r>
-            <a:r>
-              <a:rPr lang="en-US" dirty="0" err="1"/>
-              <a:t>card.red</a:t>
-            </a:r>
-            <a:r>
-              <a:rPr lang="en-US" dirty="0"/>
-              <a:t> = 0 and</a:t>
-            </a:r>
-          </a:p>
-          <a:p>
-            <a:r>
-              <a:rPr lang="en-US" dirty="0"/>
-              <a:t>      </a:t>
-            </a:r>
-            <a:r>
-              <a:rPr lang="en-US" dirty="0" err="1"/>
-              <a:t>card.blue</a:t>
-            </a:r>
-            <a:r>
-              <a:rPr lang="en-US" dirty="0"/>
-              <a:t> = 0 and</a:t>
-            </a:r>
-          </a:p>
-          <a:p>
-            <a:r>
-              <a:rPr lang="en-US" dirty="0"/>
-              <a:t>      </a:t>
-            </a:r>
-            <a:r>
-              <a:rPr lang="en-US" dirty="0" err="1"/>
-              <a:t>card.type</a:t>
-            </a:r>
-            <a:r>
-              <a:rPr lang="en-US" dirty="0"/>
-              <a:t> NOT LIKE "%LAND%"</a:t>
-            </a:r>
+            <a:endParaRPr lang="en-US"/>
           </a:p>
         </p:txBody>
       </p:sp>
     </p:spTree>
     <p:extLst>
       <p:ext uri="{BB962C8B-B14F-4D97-AF65-F5344CB8AC3E}">
-        <p14:creationId xmlns:p14="http://schemas.microsoft.com/office/powerpoint/2010/main" val="4076547048"/>
+        <p14:creationId xmlns:p14="http://schemas.microsoft.com/office/powerpoint/2010/main" val="847096583"/>
       </p:ext>
     </p:extLst>
   </p:cSld>
@@ -10010,26 +10057,21 @@
             <p:ph type="title"/>
           </p:nvPr>
         </p:nvSpPr>
-        <p:spPr>
-          <a:xfrm>
-            <a:off x="1045564" y="-169889"/>
-            <a:ext cx="10131425" cy="1456267"/>
-          </a:xfrm>
-        </p:spPr>
-        <p:txBody>
-          <a:bodyPr/>
-          <a:lstStyle/>
-          <a:p>
-            <a:r>
-              <a:rPr lang="en-US" dirty="0"/>
-              <a:t>Result</a:t>
-            </a:r>
-          </a:p>
-        </p:txBody>
-      </p:sp>
-      <p:sp>
-        <p:nvSpPr>
-          <p:cNvPr id="5" name="Content Placeholder 4"/>
+        <p:spPr/>
+        <p:txBody>
+          <a:bodyPr/>
+          <a:lstStyle/>
+          <a:p>
+            <a:r>
+              <a:rPr lang="en-US" dirty="0"/>
+              <a:t>All exclusively black and green cards</a:t>
+            </a:r>
+          </a:p>
+        </p:txBody>
+      </p:sp>
+      <p:sp>
+        <p:nvSpPr>
+          <p:cNvPr id="3" name="Content Placeholder 2"/>
           <p:cNvSpPr>
             <a:spLocks noGrp="1"/>
           </p:cNvSpPr>
@@ -10042,38 +10084,107 @@
           <a:bodyPr/>
           <a:lstStyle/>
           <a:p>
-            <a:endParaRPr lang="en-US"/>
-          </a:p>
-        </p:txBody>
-      </p:sp>
-      <p:pic>
-        <p:nvPicPr>
-          <p:cNvPr id="6" name="Picture 5"/>
-          <p:cNvPicPr>
-            <a:picLocks noChangeAspect="1"/>
-          </p:cNvPicPr>
-          <p:nvPr/>
-        </p:nvPicPr>
-        <p:blipFill>
-          <a:blip r:embed="rId2"/>
-          <a:stretch>
-            <a:fillRect/>
-          </a:stretch>
-        </p:blipFill>
-        <p:spPr>
-          <a:xfrm>
-            <a:off x="0" y="1673"/>
-            <a:ext cx="12192000" cy="6854653"/>
-          </a:xfrm>
-          <a:prstGeom prst="rect">
-            <a:avLst/>
-          </a:prstGeom>
-        </p:spPr>
-      </p:pic>
+            <a:r>
+              <a:rPr lang="en-US" dirty="0"/>
+              <a:t>SELECT *</a:t>
+            </a:r>
+          </a:p>
+          <a:p>
+            <a:r>
+              <a:rPr lang="en-US" dirty="0"/>
+              <a:t>FROM cards</a:t>
+            </a:r>
+          </a:p>
+          <a:p>
+            <a:r>
+              <a:rPr lang="en-US" dirty="0"/>
+              <a:t>WHERE </a:t>
+            </a:r>
+            <a:r>
+              <a:rPr lang="en-US" dirty="0" err="1"/>
+              <a:t>card.black</a:t>
+            </a:r>
+            <a:r>
+              <a:rPr lang="en-US" dirty="0"/>
+              <a:t> = 1 and</a:t>
+            </a:r>
+          </a:p>
+          <a:p>
+            <a:r>
+              <a:rPr lang="en-US" dirty="0"/>
+              <a:t>      </a:t>
+            </a:r>
+            <a:r>
+              <a:rPr lang="en-US" dirty="0" err="1"/>
+              <a:t>card.green</a:t>
+            </a:r>
+            <a:r>
+              <a:rPr lang="en-US" dirty="0"/>
+              <a:t> = 1 and</a:t>
+            </a:r>
+          </a:p>
+          <a:p>
+            <a:r>
+              <a:rPr lang="en-US" dirty="0"/>
+              <a:t>      </a:t>
+            </a:r>
+            <a:r>
+              <a:rPr lang="en-US" dirty="0" err="1"/>
+              <a:t>card.white</a:t>
+            </a:r>
+            <a:r>
+              <a:rPr lang="en-US" dirty="0"/>
+              <a:t> = 0 and</a:t>
+            </a:r>
+          </a:p>
+          <a:p>
+            <a:r>
+              <a:rPr lang="en-US" dirty="0"/>
+              <a:t>      </a:t>
+            </a:r>
+            <a:r>
+              <a:rPr lang="en-US" dirty="0" err="1"/>
+              <a:t>card.red</a:t>
+            </a:r>
+            <a:r>
+              <a:rPr lang="en-US" dirty="0"/>
+              <a:t> = 0 and</a:t>
+            </a:r>
+          </a:p>
+          <a:p>
+            <a:r>
+              <a:rPr lang="en-US" dirty="0"/>
+              <a:t>      </a:t>
+            </a:r>
+            <a:r>
+              <a:rPr lang="en-US" dirty="0" err="1"/>
+              <a:t>card.blue</a:t>
+            </a:r>
+            <a:r>
+              <a:rPr lang="en-US" dirty="0"/>
+              <a:t> = 0 and</a:t>
+            </a:r>
+          </a:p>
+          <a:p>
+            <a:r>
+              <a:rPr lang="en-US" dirty="0"/>
+              <a:t>      </a:t>
+            </a:r>
+            <a:r>
+              <a:rPr lang="en-US" dirty="0" err="1"/>
+              <a:t>card.type</a:t>
+            </a:r>
+            <a:r>
+              <a:rPr lang="en-US" dirty="0"/>
+              <a:t> NOT LIKE "%LAND%"</a:t>
+            </a:r>
+          </a:p>
+        </p:txBody>
+      </p:sp>
     </p:spTree>
     <p:extLst>
       <p:ext uri="{BB962C8B-B14F-4D97-AF65-F5344CB8AC3E}">
-        <p14:creationId xmlns:p14="http://schemas.microsoft.com/office/powerpoint/2010/main" val="518289298"/>
+        <p14:creationId xmlns:p14="http://schemas.microsoft.com/office/powerpoint/2010/main" val="4076547048"/>
       </p:ext>
     </p:extLst>
   </p:cSld>

</xml_diff>

<commit_message>
woops left something in the presentation
</commit_message>
<xml_diff>
--- a/project/presentation/Databases project.pptx
+++ b/project/presentation/Databases project.pptx
@@ -7095,7 +7095,7 @@
         <p:spPr/>
         <p:txBody>
           <a:bodyPr>
-            <a:normAutofit fontScale="92500" lnSpcReduction="10000"/>
+            <a:normAutofit/>
           </a:bodyPr>
           <a:lstStyle/>
           <a:p>
@@ -7126,7 +7126,7 @@
           <a:p>
             <a:r>
               <a:rPr lang="en-US" dirty="0"/>
-              <a:t>Printed in 100 different languages and played competitively</a:t>
+              <a:t>Printed in 11 different languages and played competitively</a:t>
             </a:r>
           </a:p>
           <a:p>
@@ -7162,38 +7162,13 @@
             </a:r>
             <a:r>
               <a:rPr lang="en-US" dirty="0"/>
-              <a:t> players looking to construct effective decks.</a:t>
-            </a:r>
-          </a:p>
-          <a:p>
-            <a:r>
-              <a:rPr lang="en-US" dirty="0"/>
-              <a:t>Magic the gathering, or </a:t>
-            </a:r>
-            <a:r>
-              <a:rPr lang="en-US" dirty="0" err="1"/>
-              <a:t>MtG</a:t>
-            </a:r>
-            <a:r>
-              <a:rPr lang="en-US" dirty="0"/>
-              <a:t>, is a popular trading card game owned by Wizards of the Coast, LLC. An estimated 20 million players play </a:t>
-            </a:r>
-            <a:r>
-              <a:rPr lang="en-US" dirty="0" err="1"/>
-              <a:t>MtG</a:t>
-            </a:r>
-            <a:r>
-              <a:rPr lang="en-US" dirty="0"/>
-              <a:t> around the world. </a:t>
-            </a:r>
-            <a:r>
-              <a:rPr lang="en-US" dirty="0" err="1"/>
-              <a:t>MtG</a:t>
-            </a:r>
-            <a:r>
-              <a:rPr lang="en-US" dirty="0"/>
-              <a:t> has been printed in 11 different languages and is played competitively, with prize pools reaching around $250,000. Wizards of the Coast sponsors a considerable number of these tournaments.</a:t>
-            </a:r>
+              <a:t> players looking to construct effective </a:t>
+            </a:r>
+            <a:r>
+              <a:rPr lang="en-US"/>
+              <a:t>decks.</a:t>
+            </a:r>
+            <a:endParaRPr lang="en-US" dirty="0"/>
           </a:p>
         </p:txBody>
       </p:sp>

</xml_diff>